<commit_message>
adding a slide illustrating dataframes
</commit_message>
<xml_diff>
--- a/assets/lectures/lec03/03-datatables-indexes-pandas.pptx
+++ b/assets/lectures/lec03/03-datatables-indexes-pandas.pptx
@@ -21051,6 +21051,671 @@
             <a:r>
               <a:rPr lang="en-US" dirty="0"/>
               <a:t> object represents a table with column names, rows, and indices</a:t>
+            </a:r>
+          </a:p>
+        </p:txBody>
+      </p:sp>
+      <p:graphicFrame>
+        <p:nvGraphicFramePr>
+          <p:cNvPr id="4" name="Table 3">
+            <a:extLst>
+              <a:ext uri="{FF2B5EF4-FFF2-40B4-BE49-F238E27FC236}">
+                <a16:creationId xmlns:a16="http://schemas.microsoft.com/office/drawing/2014/main" id="{D64F6C24-8A6E-384E-AF19-07E2A83E6A88}"/>
+              </a:ext>
+            </a:extLst>
+          </p:cNvPr>
+          <p:cNvGraphicFramePr>
+            <a:graphicFrameLocks noGrp="1"/>
+          </p:cNvGraphicFramePr>
+          <p:nvPr>
+            <p:extLst>
+              <p:ext uri="{D42A27DB-BD31-4B8C-83A1-F6EECF244321}">
+                <p14:modId xmlns:p14="http://schemas.microsoft.com/office/powerpoint/2010/main" val="3669769396"/>
+              </p:ext>
+            </p:extLst>
+          </p:nvPr>
+        </p:nvGraphicFramePr>
+        <p:xfrm>
+          <a:off x="2262131" y="2821984"/>
+          <a:ext cx="6096000" cy="1483360"/>
+        </p:xfrm>
+        <a:graphic>
+          <a:graphicData uri="http://schemas.openxmlformats.org/drawingml/2006/table">
+            <a:tbl>
+              <a:tblPr firstRow="1" bandRow="1">
+                <a:tableStyleId>{5C22544A-7EE6-4342-B048-85BDC9FD1C3A}</a:tableStyleId>
+              </a:tblPr>
+              <a:tblGrid>
+                <a:gridCol w="1219200">
+                  <a:extLst>
+                    <a:ext uri="{9D8B030D-6E8A-4147-A177-3AD203B41FA5}">
+                      <a16:colId xmlns:a16="http://schemas.microsoft.com/office/drawing/2014/main" val="2463344827"/>
+                    </a:ext>
+                  </a:extLst>
+                </a:gridCol>
+                <a:gridCol w="1219200">
+                  <a:extLst>
+                    <a:ext uri="{9D8B030D-6E8A-4147-A177-3AD203B41FA5}">
+                      <a16:colId xmlns:a16="http://schemas.microsoft.com/office/drawing/2014/main" val="1027214189"/>
+                    </a:ext>
+                  </a:extLst>
+                </a:gridCol>
+                <a:gridCol w="1219200">
+                  <a:extLst>
+                    <a:ext uri="{9D8B030D-6E8A-4147-A177-3AD203B41FA5}">
+                      <a16:colId xmlns:a16="http://schemas.microsoft.com/office/drawing/2014/main" val="1931676947"/>
+                    </a:ext>
+                  </a:extLst>
+                </a:gridCol>
+                <a:gridCol w="1219200">
+                  <a:extLst>
+                    <a:ext uri="{9D8B030D-6E8A-4147-A177-3AD203B41FA5}">
+                      <a16:colId xmlns:a16="http://schemas.microsoft.com/office/drawing/2014/main" val="1919480331"/>
+                    </a:ext>
+                  </a:extLst>
+                </a:gridCol>
+                <a:gridCol w="1219200">
+                  <a:extLst>
+                    <a:ext uri="{9D8B030D-6E8A-4147-A177-3AD203B41FA5}">
+                      <a16:colId xmlns:a16="http://schemas.microsoft.com/office/drawing/2014/main" val="2400376328"/>
+                    </a:ext>
+                  </a:extLst>
+                </a:gridCol>
+              </a:tblGrid>
+              <a:tr h="370840">
+                <a:tc>
+                  <a:txBody>
+                    <a:bodyPr/>
+                    <a:lstStyle/>
+                    <a:p>
+                      <a:endParaRPr lang="en-US" dirty="0"/>
+                    </a:p>
+                  </a:txBody>
+                  <a:tcPr/>
+                </a:tc>
+                <a:tc>
+                  <a:txBody>
+                    <a:bodyPr/>
+                    <a:lstStyle/>
+                    <a:p>
+                      <a:r>
+                        <a:rPr lang="en-US" dirty="0"/>
+                        <a:t>Age</a:t>
+                      </a:r>
+                    </a:p>
+                  </a:txBody>
+                  <a:tcPr/>
+                </a:tc>
+                <a:tc>
+                  <a:txBody>
+                    <a:bodyPr/>
+                    <a:lstStyle/>
+                    <a:p>
+                      <a:r>
+                        <a:rPr lang="en-US" dirty="0"/>
+                        <a:t>Sex</a:t>
+                      </a:r>
+                    </a:p>
+                  </a:txBody>
+                  <a:tcPr/>
+                </a:tc>
+                <a:tc>
+                  <a:txBody>
+                    <a:bodyPr/>
+                    <a:lstStyle/>
+                    <a:p>
+                      <a:r>
+                        <a:rPr lang="en-US" dirty="0"/>
+                        <a:t>State</a:t>
+                      </a:r>
+                    </a:p>
+                  </a:txBody>
+                  <a:tcPr/>
+                </a:tc>
+                <a:tc>
+                  <a:txBody>
+                    <a:bodyPr/>
+                    <a:lstStyle/>
+                    <a:p>
+                      <a:r>
+                        <a:rPr lang="en-US" dirty="0"/>
+                        <a:t>…</a:t>
+                      </a:r>
+                    </a:p>
+                  </a:txBody>
+                  <a:tcPr/>
+                </a:tc>
+                <a:extLst>
+                  <a:ext uri="{0D108BD9-81ED-4DB2-BD59-A6C34878D82A}">
+                    <a16:rowId xmlns:a16="http://schemas.microsoft.com/office/drawing/2014/main" val="256139649"/>
+                  </a:ext>
+                </a:extLst>
+              </a:tr>
+              <a:tr h="370840">
+                <a:tc>
+                  <a:txBody>
+                    <a:bodyPr/>
+                    <a:lstStyle/>
+                    <a:p>
+                      <a:r>
+                        <a:rPr lang="en-US" dirty="0"/>
+                        <a:t>0</a:t>
+                      </a:r>
+                    </a:p>
+                  </a:txBody>
+                  <a:tcPr/>
+                </a:tc>
+                <a:tc>
+                  <a:txBody>
+                    <a:bodyPr/>
+                    <a:lstStyle/>
+                    <a:p>
+                      <a:endParaRPr lang="en-US" dirty="0"/>
+                    </a:p>
+                  </a:txBody>
+                  <a:tcPr/>
+                </a:tc>
+                <a:tc>
+                  <a:txBody>
+                    <a:bodyPr/>
+                    <a:lstStyle/>
+                    <a:p>
+                      <a:endParaRPr lang="en-US"/>
+                    </a:p>
+                  </a:txBody>
+                  <a:tcPr/>
+                </a:tc>
+                <a:tc>
+                  <a:txBody>
+                    <a:bodyPr/>
+                    <a:lstStyle/>
+                    <a:p>
+                      <a:endParaRPr lang="en-US"/>
+                    </a:p>
+                  </a:txBody>
+                  <a:tcPr/>
+                </a:tc>
+                <a:tc>
+                  <a:txBody>
+                    <a:bodyPr/>
+                    <a:lstStyle/>
+                    <a:p>
+                      <a:endParaRPr lang="en-US"/>
+                    </a:p>
+                  </a:txBody>
+                  <a:tcPr/>
+                </a:tc>
+                <a:extLst>
+                  <a:ext uri="{0D108BD9-81ED-4DB2-BD59-A6C34878D82A}">
+                    <a16:rowId xmlns:a16="http://schemas.microsoft.com/office/drawing/2014/main" val="134340443"/>
+                  </a:ext>
+                </a:extLst>
+              </a:tr>
+              <a:tr h="370840">
+                <a:tc>
+                  <a:txBody>
+                    <a:bodyPr/>
+                    <a:lstStyle/>
+                    <a:p>
+                      <a:r>
+                        <a:rPr lang="en-US" dirty="0"/>
+                        <a:t>1</a:t>
+                      </a:r>
+                    </a:p>
+                  </a:txBody>
+                  <a:tcPr/>
+                </a:tc>
+                <a:tc>
+                  <a:txBody>
+                    <a:bodyPr/>
+                    <a:lstStyle/>
+                    <a:p>
+                      <a:endParaRPr lang="en-US"/>
+                    </a:p>
+                  </a:txBody>
+                  <a:tcPr/>
+                </a:tc>
+                <a:tc>
+                  <a:txBody>
+                    <a:bodyPr/>
+                    <a:lstStyle/>
+                    <a:p>
+                      <a:endParaRPr lang="en-US"/>
+                    </a:p>
+                  </a:txBody>
+                  <a:tcPr/>
+                </a:tc>
+                <a:tc>
+                  <a:txBody>
+                    <a:bodyPr/>
+                    <a:lstStyle/>
+                    <a:p>
+                      <a:endParaRPr lang="en-US"/>
+                    </a:p>
+                  </a:txBody>
+                  <a:tcPr/>
+                </a:tc>
+                <a:tc>
+                  <a:txBody>
+                    <a:bodyPr/>
+                    <a:lstStyle/>
+                    <a:p>
+                      <a:endParaRPr lang="en-US"/>
+                    </a:p>
+                  </a:txBody>
+                  <a:tcPr/>
+                </a:tc>
+                <a:extLst>
+                  <a:ext uri="{0D108BD9-81ED-4DB2-BD59-A6C34878D82A}">
+                    <a16:rowId xmlns:a16="http://schemas.microsoft.com/office/drawing/2014/main" val="2184355920"/>
+                  </a:ext>
+                </a:extLst>
+              </a:tr>
+              <a:tr h="370840">
+                <a:tc>
+                  <a:txBody>
+                    <a:bodyPr/>
+                    <a:lstStyle/>
+                    <a:p>
+                      <a:r>
+                        <a:rPr lang="en-US" dirty="0"/>
+                        <a:t>2</a:t>
+                      </a:r>
+                    </a:p>
+                  </a:txBody>
+                  <a:tcPr/>
+                </a:tc>
+                <a:tc>
+                  <a:txBody>
+                    <a:bodyPr/>
+                    <a:lstStyle/>
+                    <a:p>
+                      <a:endParaRPr lang="en-US"/>
+                    </a:p>
+                  </a:txBody>
+                  <a:tcPr/>
+                </a:tc>
+                <a:tc>
+                  <a:txBody>
+                    <a:bodyPr/>
+                    <a:lstStyle/>
+                    <a:p>
+                      <a:endParaRPr lang="en-US"/>
+                    </a:p>
+                  </a:txBody>
+                  <a:tcPr/>
+                </a:tc>
+                <a:tc>
+                  <a:txBody>
+                    <a:bodyPr/>
+                    <a:lstStyle/>
+                    <a:p>
+                      <a:endParaRPr lang="en-US"/>
+                    </a:p>
+                  </a:txBody>
+                  <a:tcPr/>
+                </a:tc>
+                <a:tc>
+                  <a:txBody>
+                    <a:bodyPr/>
+                    <a:lstStyle/>
+                    <a:p>
+                      <a:endParaRPr lang="en-US" dirty="0"/>
+                    </a:p>
+                  </a:txBody>
+                  <a:tcPr/>
+                </a:tc>
+                <a:extLst>
+                  <a:ext uri="{0D108BD9-81ED-4DB2-BD59-A6C34878D82A}">
+                    <a16:rowId xmlns:a16="http://schemas.microsoft.com/office/drawing/2014/main" val="708661908"/>
+                  </a:ext>
+                </a:extLst>
+              </a:tr>
+            </a:tbl>
+          </a:graphicData>
+        </a:graphic>
+      </p:graphicFrame>
+      <p:sp>
+        <p:nvSpPr>
+          <p:cNvPr id="5" name="TextBox 4">
+            <a:extLst>
+              <a:ext uri="{FF2B5EF4-FFF2-40B4-BE49-F238E27FC236}">
+                <a16:creationId xmlns:a16="http://schemas.microsoft.com/office/drawing/2014/main" id="{8C936F06-8285-E14A-9BF2-CC1D52CD13AC}"/>
+              </a:ext>
+            </a:extLst>
+          </p:cNvPr>
+          <p:cNvSpPr txBox="1"/>
+          <p:nvPr/>
+        </p:nvSpPr>
+        <p:spPr>
+          <a:xfrm>
+            <a:off x="2262131" y="1997703"/>
+            <a:ext cx="1186543" cy="584775"/>
+          </a:xfrm>
+          <a:prstGeom prst="rect">
+            <a:avLst/>
+          </a:prstGeom>
+          <a:noFill/>
+        </p:spPr>
+        <p:txBody>
+          <a:bodyPr wrap="none" rtlCol="0">
+            <a:spAutoFit/>
+          </a:bodyPr>
+          <a:lstStyle/>
+          <a:p>
+            <a:r>
+              <a:rPr lang="en-US" sz="3200" dirty="0"/>
+              <a:t>Index</a:t>
+            </a:r>
+          </a:p>
+        </p:txBody>
+      </p:sp>
+      <p:sp>
+        <p:nvSpPr>
+          <p:cNvPr id="6" name="Rounded Rectangle 5">
+            <a:extLst>
+              <a:ext uri="{FF2B5EF4-FFF2-40B4-BE49-F238E27FC236}">
+                <a16:creationId xmlns:a16="http://schemas.microsoft.com/office/drawing/2014/main" id="{2F5CAED4-1D76-0E49-A4EE-33549B51279A}"/>
+              </a:ext>
+            </a:extLst>
+          </p:cNvPr>
+          <p:cNvSpPr/>
+          <p:nvPr/>
+        </p:nvSpPr>
+        <p:spPr>
+          <a:xfrm>
+            <a:off x="2192027" y="2496326"/>
+            <a:ext cx="1325880" cy="2044730"/>
+          </a:xfrm>
+          <a:prstGeom prst="roundRect">
+            <a:avLst/>
+          </a:prstGeom>
+          <a:solidFill>
+            <a:srgbClr val="FF0000">
+              <a:alpha val="40000"/>
+            </a:srgbClr>
+          </a:solidFill>
+          <a:ln>
+            <a:solidFill>
+              <a:schemeClr val="tx1"/>
+            </a:solidFill>
+          </a:ln>
+        </p:spPr>
+        <p:style>
+          <a:lnRef idx="1">
+            <a:schemeClr val="accent2"/>
+          </a:lnRef>
+          <a:fillRef idx="2">
+            <a:schemeClr val="accent2"/>
+          </a:fillRef>
+          <a:effectRef idx="1">
+            <a:schemeClr val="accent2"/>
+          </a:effectRef>
+          <a:fontRef idx="minor">
+            <a:schemeClr val="dk1"/>
+          </a:fontRef>
+        </p:style>
+        <p:txBody>
+          <a:bodyPr rtlCol="0" anchor="ctr"/>
+          <a:lstStyle/>
+          <a:p>
+            <a:pPr algn="ctr"/>
+            <a:endParaRPr lang="en-US" dirty="0"/>
+          </a:p>
+        </p:txBody>
+      </p:sp>
+      <p:sp>
+        <p:nvSpPr>
+          <p:cNvPr id="7" name="Rounded Rectangle 6">
+            <a:extLst>
+              <a:ext uri="{FF2B5EF4-FFF2-40B4-BE49-F238E27FC236}">
+                <a16:creationId xmlns:a16="http://schemas.microsoft.com/office/drawing/2014/main" id="{BD9F3DB5-D3E6-B04F-9FD7-E85380B37BC3}"/>
+              </a:ext>
+            </a:extLst>
+          </p:cNvPr>
+          <p:cNvSpPr/>
+          <p:nvPr/>
+        </p:nvSpPr>
+        <p:spPr>
+          <a:xfrm>
+            <a:off x="1729649" y="2721400"/>
+            <a:ext cx="6830458" cy="569976"/>
+          </a:xfrm>
+          <a:prstGeom prst="roundRect">
+            <a:avLst/>
+          </a:prstGeom>
+          <a:solidFill>
+            <a:schemeClr val="accent4">
+              <a:lumMod val="60000"/>
+              <a:lumOff val="40000"/>
+              <a:alpha val="40000"/>
+            </a:schemeClr>
+          </a:solidFill>
+          <a:ln>
+            <a:solidFill>
+              <a:schemeClr val="tx1"/>
+            </a:solidFill>
+          </a:ln>
+        </p:spPr>
+        <p:style>
+          <a:lnRef idx="1">
+            <a:schemeClr val="accent2"/>
+          </a:lnRef>
+          <a:fillRef idx="2">
+            <a:schemeClr val="accent2"/>
+          </a:fillRef>
+          <a:effectRef idx="1">
+            <a:schemeClr val="accent2"/>
+          </a:effectRef>
+          <a:fontRef idx="minor">
+            <a:schemeClr val="dk1"/>
+          </a:fontRef>
+        </p:style>
+        <p:txBody>
+          <a:bodyPr rtlCol="0" anchor="ctr"/>
+          <a:lstStyle/>
+          <a:p>
+            <a:pPr algn="ctr"/>
+            <a:endParaRPr lang="en-US" dirty="0"/>
+          </a:p>
+        </p:txBody>
+      </p:sp>
+      <p:sp>
+        <p:nvSpPr>
+          <p:cNvPr id="9" name="TextBox 8">
+            <a:extLst>
+              <a:ext uri="{FF2B5EF4-FFF2-40B4-BE49-F238E27FC236}">
+                <a16:creationId xmlns:a16="http://schemas.microsoft.com/office/drawing/2014/main" id="{8509AC07-C858-A24B-AA8E-FAA6416427C9}"/>
+              </a:ext>
+            </a:extLst>
+          </p:cNvPr>
+          <p:cNvSpPr txBox="1"/>
+          <p:nvPr/>
+        </p:nvSpPr>
+        <p:spPr>
+          <a:xfrm>
+            <a:off x="660125" y="2652445"/>
+            <a:ext cx="1069524" cy="707886"/>
+          </a:xfrm>
+          <a:prstGeom prst="rect">
+            <a:avLst/>
+          </a:prstGeom>
+          <a:noFill/>
+        </p:spPr>
+        <p:txBody>
+          <a:bodyPr wrap="none" rtlCol="0">
+            <a:spAutoFit/>
+          </a:bodyPr>
+          <a:lstStyle/>
+          <a:p>
+            <a:pPr algn="r"/>
+            <a:r>
+              <a:rPr lang="en-US" sz="2000" dirty="0"/>
+              <a:t>Column</a:t>
+            </a:r>
+            <a:br>
+              <a:rPr lang="en-US" sz="2000" dirty="0"/>
+            </a:br>
+            <a:r>
+              <a:rPr lang="en-US" sz="2000" dirty="0"/>
+              <a:t>Names</a:t>
+            </a:r>
+          </a:p>
+        </p:txBody>
+      </p:sp>
+      <p:sp>
+        <p:nvSpPr>
+          <p:cNvPr id="10" name="Rounded Rectangle 9">
+            <a:extLst>
+              <a:ext uri="{FF2B5EF4-FFF2-40B4-BE49-F238E27FC236}">
+                <a16:creationId xmlns:a16="http://schemas.microsoft.com/office/drawing/2014/main" id="{F40098EF-0822-444B-8A37-BAD5E9B9E10C}"/>
+              </a:ext>
+            </a:extLst>
+          </p:cNvPr>
+          <p:cNvSpPr/>
+          <p:nvPr/>
+        </p:nvSpPr>
+        <p:spPr>
+          <a:xfrm>
+            <a:off x="4634732" y="2511473"/>
+            <a:ext cx="1325880" cy="2044730"/>
+          </a:xfrm>
+          <a:prstGeom prst="roundRect">
+            <a:avLst/>
+          </a:prstGeom>
+          <a:solidFill>
+            <a:schemeClr val="bg2">
+              <a:alpha val="40000"/>
+            </a:schemeClr>
+          </a:solidFill>
+          <a:ln>
+            <a:solidFill>
+              <a:schemeClr val="tx1"/>
+            </a:solidFill>
+          </a:ln>
+        </p:spPr>
+        <p:style>
+          <a:lnRef idx="1">
+            <a:schemeClr val="accent2"/>
+          </a:lnRef>
+          <a:fillRef idx="2">
+            <a:schemeClr val="accent2"/>
+          </a:fillRef>
+          <a:effectRef idx="1">
+            <a:schemeClr val="accent2"/>
+          </a:effectRef>
+          <a:fontRef idx="minor">
+            <a:schemeClr val="dk1"/>
+          </a:fontRef>
+        </p:style>
+        <p:txBody>
+          <a:bodyPr rtlCol="0" anchor="ctr"/>
+          <a:lstStyle/>
+          <a:p>
+            <a:pPr algn="ctr"/>
+            <a:endParaRPr lang="en-US" dirty="0"/>
+          </a:p>
+        </p:txBody>
+      </p:sp>
+      <p:sp>
+        <p:nvSpPr>
+          <p:cNvPr id="11" name="TextBox 10">
+            <a:extLst>
+              <a:ext uri="{FF2B5EF4-FFF2-40B4-BE49-F238E27FC236}">
+                <a16:creationId xmlns:a16="http://schemas.microsoft.com/office/drawing/2014/main" id="{440856FA-5396-DD40-8502-E285FAC7C90F}"/>
+              </a:ext>
+            </a:extLst>
+          </p:cNvPr>
+          <p:cNvSpPr txBox="1"/>
+          <p:nvPr/>
+        </p:nvSpPr>
+        <p:spPr>
+          <a:xfrm>
+            <a:off x="4597436" y="2059258"/>
+            <a:ext cx="1425390" cy="523220"/>
+          </a:xfrm>
+          <a:prstGeom prst="rect">
+            <a:avLst/>
+          </a:prstGeom>
+          <a:noFill/>
+        </p:spPr>
+        <p:txBody>
+          <a:bodyPr wrap="none" rtlCol="0">
+            <a:spAutoFit/>
+          </a:bodyPr>
+          <a:lstStyle/>
+          <a:p>
+            <a:r>
+              <a:rPr lang="en-US" sz="2800" dirty="0"/>
+              <a:t>Column</a:t>
+            </a:r>
+          </a:p>
+        </p:txBody>
+      </p:sp>
+      <p:sp>
+        <p:nvSpPr>
+          <p:cNvPr id="12" name="Rounded Rectangular Callout 11">
+            <a:extLst>
+              <a:ext uri="{FF2B5EF4-FFF2-40B4-BE49-F238E27FC236}">
+                <a16:creationId xmlns:a16="http://schemas.microsoft.com/office/drawing/2014/main" id="{77D8C91E-21C2-234E-B29D-E4445A7862C6}"/>
+              </a:ext>
+            </a:extLst>
+          </p:cNvPr>
+          <p:cNvSpPr/>
+          <p:nvPr/>
+        </p:nvSpPr>
+        <p:spPr>
+          <a:xfrm>
+            <a:off x="6103345" y="1795749"/>
+            <a:ext cx="2254786" cy="700577"/>
+          </a:xfrm>
+          <a:prstGeom prst="wedgeRoundRectCallout">
+            <a:avLst>
+              <a:gd name="adj1" fmla="val -56989"/>
+              <a:gd name="adj2" fmla="val 53261"/>
+              <a:gd name="adj3" fmla="val 16667"/>
+            </a:avLst>
+          </a:prstGeom>
+          <a:solidFill>
+            <a:schemeClr val="bg2"/>
+          </a:solidFill>
+          <a:ln>
+            <a:solidFill>
+              <a:schemeClr val="tx1"/>
+            </a:solidFill>
+          </a:ln>
+        </p:spPr>
+        <p:style>
+          <a:lnRef idx="1">
+            <a:schemeClr val="accent2"/>
+          </a:lnRef>
+          <a:fillRef idx="2">
+            <a:schemeClr val="accent2"/>
+          </a:fillRef>
+          <a:effectRef idx="1">
+            <a:schemeClr val="accent2"/>
+          </a:effectRef>
+          <a:fontRef idx="minor">
+            <a:schemeClr val="dk1"/>
+          </a:fontRef>
+        </p:style>
+        <p:txBody>
+          <a:bodyPr rot="0" spcFirstLastPara="0" vertOverflow="overflow" horzOverflow="overflow" vert="horz" wrap="square" lIns="91440" tIns="45720" rIns="91440" bIns="45720" numCol="1" spcCol="0" rtlCol="0" fromWordArt="0" anchor="ctr" anchorCtr="0" forceAA="0" compatLnSpc="1">
+            <a:prstTxWarp prst="textNoShape">
+              <a:avLst/>
+            </a:prstTxWarp>
+            <a:noAutofit/>
+          </a:bodyPr>
+          <a:lstStyle/>
+          <a:p>
+            <a:pPr algn="ctr"/>
+            <a:r>
+              <a:rPr lang="en-US" dirty="0">
+                <a:solidFill>
+                  <a:schemeClr val="bg1"/>
+                </a:solidFill>
+              </a:rPr>
+              <a:t>All data in a column must be the same kind…</a:t>
             </a:r>
           </a:p>
         </p:txBody>

</xml_diff>